<commit_message>
Presentation Slides is updated
Added special effect for technical challenges.
</commit_message>
<xml_diff>
--- a/FinalProject/docs/presentation.pptx
+++ b/FinalProject/docs/presentation.pptx
@@ -5,7 +5,7 @@
     <p:sldMasterId id="2147483648" r:id="rId1"/>
   </p:sldMasterIdLst>
   <p:notesMasterIdLst>
-    <p:notesMasterId r:id="rId10"/>
+    <p:notesMasterId r:id="rId11"/>
   </p:notesMasterIdLst>
   <p:sldIdLst>
     <p:sldId id="256" r:id="rId2"/>
@@ -14,8 +14,9 @@
     <p:sldId id="258" r:id="rId5"/>
     <p:sldId id="262" r:id="rId6"/>
     <p:sldId id="261" r:id="rId7"/>
-    <p:sldId id="265" r:id="rId8"/>
-    <p:sldId id="266" r:id="rId9"/>
+    <p:sldId id="267" r:id="rId8"/>
+    <p:sldId id="265" r:id="rId9"/>
+    <p:sldId id="266" r:id="rId10"/>
   </p:sldIdLst>
   <p:sldSz cx="12192000" cy="6858000"/>
   <p:notesSz cx="6858000" cy="9144000"/>
@@ -116,7 +117,7 @@
   </p:defaultTextStyle>
   <p:extLst>
     <p:ext uri="{EFAFB233-063F-42B5-8137-9DF3F51BA10A}">
-      <p15:sldGuideLst xmlns:p15="http://schemas.microsoft.com/office/powerpoint/2012/main"/>
+      <p15:sldGuideLst xmlns:p15="http://schemas.microsoft.com/office/powerpoint/2012/main" xmlns=""/>
     </p:ext>
   </p:extLst>
 </p:presentation>
@@ -204,7 +205,7 @@
           <a:p>
             <a:fld id="{191B3BFD-F25D-D840-85EA-4630FB6112AD}" type="datetimeFigureOut">
               <a:rPr lang="en-US" smtClean="0"/>
-              <a:t>12/9/2015</a:t>
+              <a:t>12/9/15</a:t>
             </a:fld>
             <a:endParaRPr lang="en-US"/>
           </a:p>
@@ -808,7 +809,7 @@
           <a:p>
             <a:fld id="{C5317951-4F10-2244-A48F-9965807DBCDD}" type="slidenum">
               <a:rPr lang="en-US" smtClean="0"/>
-              <a:t>8</a:t>
+              <a:t>9</a:t>
             </a:fld>
             <a:endParaRPr lang="en-US"/>
           </a:p>
@@ -1041,7 +1042,7 @@
             <a:fld id="{B61BEF0D-F0BB-DE4B-95CE-6DB70DBA9567}" type="datetimeFigureOut">
               <a:rPr lang="en-US" dirty="0"/>
               <a:pPr/>
-              <a:t>12/9/2015</a:t>
+              <a:t>12/9/15</a:t>
             </a:fld>
             <a:endParaRPr lang="en-US" dirty="0"/>
           </a:p>
@@ -1329,7 +1330,7 @@
             <a:fld id="{B61BEF0D-F0BB-DE4B-95CE-6DB70DBA9567}" type="datetimeFigureOut">
               <a:rPr lang="en-US" dirty="0"/>
               <a:pPr/>
-              <a:t>12/9/2015</a:t>
+              <a:t>12/9/15</a:t>
             </a:fld>
             <a:endParaRPr lang="en-US" dirty="0"/>
           </a:p>
@@ -1585,7 +1586,7 @@
             <a:fld id="{B61BEF0D-F0BB-DE4B-95CE-6DB70DBA9567}" type="datetimeFigureOut">
               <a:rPr lang="en-US" dirty="0"/>
               <a:pPr/>
-              <a:t>12/9/2015</a:t>
+              <a:t>12/9/15</a:t>
             </a:fld>
             <a:endParaRPr lang="en-US" dirty="0"/>
           </a:p>
@@ -2051,7 +2052,7 @@
             <a:fld id="{B61BEF0D-F0BB-DE4B-95CE-6DB70DBA9567}" type="datetimeFigureOut">
               <a:rPr lang="en-US" dirty="0"/>
               <a:pPr/>
-              <a:t>12/9/2015</a:t>
+              <a:t>12/9/15</a:t>
             </a:fld>
             <a:endParaRPr lang="en-US" dirty="0"/>
           </a:p>
@@ -2228,7 +2229,7 @@
             <a:fld id="{B61BEF0D-F0BB-DE4B-95CE-6DB70DBA9567}" type="datetimeFigureOut">
               <a:rPr lang="en-US" dirty="0"/>
               <a:pPr/>
-              <a:t>12/9/2015</a:t>
+              <a:t>12/9/15</a:t>
             </a:fld>
             <a:endParaRPr lang="en-US" dirty="0"/>
           </a:p>
@@ -2801,7 +2802,7 @@
             <a:fld id="{B61BEF0D-F0BB-DE4B-95CE-6DB70DBA9567}" type="datetimeFigureOut">
               <a:rPr lang="en-US" dirty="0"/>
               <a:pPr/>
-              <a:t>12/9/2015</a:t>
+              <a:t>12/9/15</a:t>
             </a:fld>
             <a:endParaRPr lang="en-US" dirty="0"/>
           </a:p>
@@ -3130,7 +3131,7 @@
             <a:fld id="{B61BEF0D-F0BB-DE4B-95CE-6DB70DBA9567}" type="datetimeFigureOut">
               <a:rPr lang="en-US" dirty="0"/>
               <a:pPr/>
-              <a:t>12/9/2015</a:t>
+              <a:t>12/9/15</a:t>
             </a:fld>
             <a:endParaRPr lang="en-US" dirty="0"/>
           </a:p>
@@ -3302,7 +3303,7 @@
             <a:fld id="{B61BEF0D-F0BB-DE4B-95CE-6DB70DBA9567}" type="datetimeFigureOut">
               <a:rPr lang="en-US" dirty="0"/>
               <a:pPr/>
-              <a:t>12/9/2015</a:t>
+              <a:t>12/9/15</a:t>
             </a:fld>
             <a:endParaRPr lang="en-US" dirty="0"/>
           </a:p>
@@ -3479,7 +3480,7 @@
             <a:fld id="{B61BEF0D-F0BB-DE4B-95CE-6DB70DBA9567}" type="datetimeFigureOut">
               <a:rPr lang="en-US" dirty="0"/>
               <a:pPr/>
-              <a:t>12/9/2015</a:t>
+              <a:t>12/9/15</a:t>
             </a:fld>
             <a:endParaRPr lang="en-US" dirty="0"/>
           </a:p>
@@ -3646,7 +3647,7 @@
             <a:fld id="{B61BEF0D-F0BB-DE4B-95CE-6DB70DBA9567}" type="datetimeFigureOut">
               <a:rPr lang="en-US" dirty="0"/>
               <a:pPr/>
-              <a:t>12/9/2015</a:t>
+              <a:t>12/9/15</a:t>
             </a:fld>
             <a:endParaRPr lang="en-US" dirty="0"/>
           </a:p>
@@ -3900,7 +3901,7 @@
             <a:fld id="{B61BEF0D-F0BB-DE4B-95CE-6DB70DBA9567}" type="datetimeFigureOut">
               <a:rPr lang="en-US" dirty="0"/>
               <a:pPr/>
-              <a:t>12/9/2015</a:t>
+              <a:t>12/9/15</a:t>
             </a:fld>
             <a:endParaRPr lang="en-US" dirty="0"/>
           </a:p>
@@ -4189,7 +4190,7 @@
             <a:fld id="{B61BEF0D-F0BB-DE4B-95CE-6DB70DBA9567}" type="datetimeFigureOut">
               <a:rPr lang="en-US" dirty="0"/>
               <a:pPr/>
-              <a:t>12/9/2015</a:t>
+              <a:t>12/9/15</a:t>
             </a:fld>
             <a:endParaRPr lang="en-US" dirty="0"/>
           </a:p>
@@ -4616,7 +4617,7 @@
             <a:fld id="{B61BEF0D-F0BB-DE4B-95CE-6DB70DBA9567}" type="datetimeFigureOut">
               <a:rPr lang="en-US" dirty="0"/>
               <a:pPr/>
-              <a:t>12/9/2015</a:t>
+              <a:t>12/9/15</a:t>
             </a:fld>
             <a:endParaRPr lang="en-US" dirty="0"/>
           </a:p>
@@ -4731,7 +4732,7 @@
             <a:fld id="{B61BEF0D-F0BB-DE4B-95CE-6DB70DBA9567}" type="datetimeFigureOut">
               <a:rPr lang="en-US" dirty="0"/>
               <a:pPr/>
-              <a:t>12/9/2015</a:t>
+              <a:t>12/9/15</a:t>
             </a:fld>
             <a:endParaRPr lang="en-US" dirty="0"/>
           </a:p>
@@ -4823,7 +4824,7 @@
             <a:fld id="{B61BEF0D-F0BB-DE4B-95CE-6DB70DBA9567}" type="datetimeFigureOut">
               <a:rPr lang="en-US" dirty="0"/>
               <a:pPr/>
-              <a:t>12/9/2015</a:t>
+              <a:t>12/9/15</a:t>
             </a:fld>
             <a:endParaRPr lang="en-US" dirty="0"/>
           </a:p>
@@ -5103,7 +5104,7 @@
             <a:fld id="{B61BEF0D-F0BB-DE4B-95CE-6DB70DBA9567}" type="datetimeFigureOut">
               <a:rPr lang="en-US" dirty="0"/>
               <a:pPr/>
-              <a:t>12/9/2015</a:t>
+              <a:t>12/9/15</a:t>
             </a:fld>
             <a:endParaRPr lang="en-US" dirty="0"/>
           </a:p>
@@ -5391,7 +5392,7 @@
             <a:fld id="{B61BEF0D-F0BB-DE4B-95CE-6DB70DBA9567}" type="datetimeFigureOut">
               <a:rPr lang="en-US" dirty="0"/>
               <a:pPr/>
-              <a:t>12/9/2015</a:t>
+              <a:t>12/9/15</a:t>
             </a:fld>
             <a:endParaRPr lang="en-US" dirty="0"/>
           </a:p>
@@ -5619,7 +5620,7 @@
             <a:fld id="{B61BEF0D-F0BB-DE4B-95CE-6DB70DBA9567}" type="datetimeFigureOut">
               <a:rPr lang="en-US" dirty="0"/>
               <a:pPr/>
-              <a:t>12/9/2015</a:t>
+              <a:t>12/9/15</a:t>
             </a:fld>
             <a:endParaRPr lang="en-US" dirty="0"/>
           </a:p>
@@ -6472,13 +6473,8 @@
             </a:r>
             <a:r>
               <a:rPr lang="en-US" sz="2400" dirty="0" smtClean="0"/>
-              <a:t> </a:t>
-            </a:r>
-            <a:r>
-              <a:rPr lang="en-US" sz="2400" dirty="0" smtClean="0"/>
-              <a:t>Gao</a:t>
-            </a:r>
-            <a:endParaRPr lang="en-US" sz="2400" dirty="0" smtClean="0"/>
+              <a:t> Gao</a:t>
+            </a:r>
           </a:p>
           <a:p>
             <a:r>
@@ -6506,7 +6502,7 @@
   <p:timing>
     <p:tnLst>
       <p:par>
-        <p:cTn id="1" dur="indefinite" restart="never" nodeType="tmRoot"/>
+        <p:cTn xmlns:p14="http://schemas.microsoft.com/office/powerpoint/2010/main" id="1" dur="indefinite" restart="never" nodeType="tmRoot"/>
       </p:par>
     </p:tnLst>
   </p:timing>
@@ -6651,7 +6647,7 @@
   <p:timing>
     <p:tnLst>
       <p:par>
-        <p:cTn id="1" dur="indefinite" restart="never" nodeType="tmRoot"/>
+        <p:cTn xmlns:p14="http://schemas.microsoft.com/office/powerpoint/2010/main" id="1" dur="indefinite" restart="never" nodeType="tmRoot"/>
       </p:par>
     </p:tnLst>
   </p:timing>
@@ -6952,7 +6948,7 @@
   <p:timing>
     <p:tnLst>
       <p:par>
-        <p:cTn id="1" dur="indefinite" restart="never" nodeType="tmRoot"/>
+        <p:cTn xmlns:p14="http://schemas.microsoft.com/office/powerpoint/2010/main" id="1" dur="indefinite" restart="never" nodeType="tmRoot"/>
       </p:par>
     </p:tnLst>
   </p:timing>
@@ -7048,11 +7044,7 @@
             <a:pPr lvl="1"/>
             <a:r>
               <a:rPr lang="en-US" sz="2400" dirty="0"/>
-              <a:t>M</a:t>
-            </a:r>
-            <a:r>
-              <a:rPr lang="en-US" sz="2400" dirty="0"/>
-              <a:t>ultiple light sources to create a nice ambient scene</a:t>
+              <a:t>Multiple light sources to create a nice ambient scene</a:t>
             </a:r>
           </a:p>
           <a:p>
@@ -7101,7 +7093,7 @@
   <p:timing>
     <p:tnLst>
       <p:par>
-        <p:cTn id="1" dur="indefinite" restart="never" nodeType="tmRoot"/>
+        <p:cTn xmlns:p14="http://schemas.microsoft.com/office/powerpoint/2010/main" id="1" dur="indefinite" restart="never" nodeType="tmRoot"/>
       </p:par>
     </p:tnLst>
   </p:timing>
@@ -7275,7 +7267,7 @@
   <p:timing>
     <p:tnLst>
       <p:par>
-        <p:cTn id="1" dur="indefinite" restart="never" nodeType="tmRoot"/>
+        <p:cTn xmlns:p14="http://schemas.microsoft.com/office/powerpoint/2010/main" id="1" dur="indefinite" restart="never" nodeType="tmRoot"/>
       </p:par>
     </p:tnLst>
   </p:timing>
@@ -7353,9 +7345,33 @@
         </p:blipFill>
         <p:spPr>
           <a:xfrm>
-            <a:off x="2068379" y="2268292"/>
-            <a:ext cx="8052061" cy="3321475"/>
-          </a:xfrm>
+            <a:off x="1286772" y="2101180"/>
+            <a:ext cx="4927204" cy="3321475"/>
+          </a:xfrm>
+        </p:spPr>
+      </p:pic>
+      <p:pic>
+        <p:nvPicPr>
+          <p:cNvPr id="3" name="Picture 2"/>
+          <p:cNvPicPr>
+            <a:picLocks noChangeAspect="1"/>
+          </p:cNvPicPr>
+          <p:nvPr/>
+        </p:nvPicPr>
+        <p:blipFill>
+          <a:blip r:embed="rId4"/>
+          <a:stretch>
+            <a:fillRect/>
+          </a:stretch>
+        </p:blipFill>
+        <p:spPr>
+          <a:xfrm>
+            <a:off x="7355376" y="2101180"/>
+            <a:ext cx="3431438" cy="3313113"/>
+          </a:xfrm>
+          <a:prstGeom prst="rect">
+            <a:avLst/>
+          </a:prstGeom>
         </p:spPr>
       </p:pic>
     </p:spTree>
@@ -7371,7 +7387,7 @@
   <p:timing>
     <p:tnLst>
       <p:par>
-        <p:cTn id="1" dur="indefinite" restart="never" nodeType="tmRoot"/>
+        <p:cTn xmlns:p14="http://schemas.microsoft.com/office/powerpoint/2010/main" id="1" dur="indefinite" restart="never" nodeType="tmRoot"/>
       </p:par>
     </p:tnLst>
   </p:timing>
@@ -7379,6 +7395,119 @@
 </file>
 
 <file path=ppt/slides/slide7.xml><?xml version="1.0" encoding="utf-8"?>
+<p:sld xmlns:a="http://schemas.openxmlformats.org/drawingml/2006/main" xmlns:r="http://schemas.openxmlformats.org/officeDocument/2006/relationships" xmlns:p="http://schemas.openxmlformats.org/presentationml/2006/main">
+  <p:cSld>
+    <p:spTree>
+      <p:nvGrpSpPr>
+        <p:cNvPr id="1" name=""/>
+        <p:cNvGrpSpPr/>
+        <p:nvPr/>
+      </p:nvGrpSpPr>
+      <p:grpSpPr>
+        <a:xfrm>
+          <a:off x="0" y="0"/>
+          <a:ext cx="0" cy="0"/>
+          <a:chOff x="0" y="0"/>
+          <a:chExt cx="0" cy="0"/>
+        </a:xfrm>
+      </p:grpSpPr>
+      <p:sp>
+        <p:nvSpPr>
+          <p:cNvPr id="2" name="Title 1"/>
+          <p:cNvSpPr>
+            <a:spLocks noGrp="1"/>
+          </p:cNvSpPr>
+          <p:nvPr>
+            <p:ph type="title"/>
+          </p:nvPr>
+        </p:nvSpPr>
+        <p:spPr/>
+        <p:txBody>
+          <a:bodyPr/>
+          <a:lstStyle/>
+          <a:p>
+            <a:r>
+              <a:rPr lang="en-US" dirty="0" smtClean="0"/>
+              <a:t>Special Effects</a:t>
+            </a:r>
+            <a:endParaRPr lang="en-US" dirty="0"/>
+          </a:p>
+        </p:txBody>
+      </p:sp>
+      <p:pic>
+        <p:nvPicPr>
+          <p:cNvPr id="6" name="Picture 5" descr="15836.af6f7fd9.200x200o.6933baaa51f1.jpeg"/>
+          <p:cNvPicPr>
+            <a:picLocks noChangeAspect="1"/>
+          </p:cNvPicPr>
+          <p:nvPr/>
+        </p:nvPicPr>
+        <p:blipFill>
+          <a:blip r:embed="rId2">
+            <a:extLst>
+              <a:ext uri="{28A0092B-C50C-407E-A947-70E740481C1C}">
+                <a14:useLocalDpi xmlns:a14="http://schemas.microsoft.com/office/drawing/2010/main" val="0"/>
+              </a:ext>
+            </a:extLst>
+          </a:blip>
+          <a:stretch>
+            <a:fillRect/>
+          </a:stretch>
+        </p:blipFill>
+        <p:spPr>
+          <a:xfrm>
+            <a:off x="1141413" y="2132539"/>
+            <a:ext cx="3812995" cy="3812995"/>
+          </a:xfrm>
+          <a:prstGeom prst="rect">
+            <a:avLst/>
+          </a:prstGeom>
+        </p:spPr>
+      </p:pic>
+      <p:pic>
+        <p:nvPicPr>
+          <p:cNvPr id="7" name="Picture 6" descr="chess_explosion.jpg"/>
+          <p:cNvPicPr>
+            <a:picLocks noChangeAspect="1"/>
+          </p:cNvPicPr>
+          <p:nvPr/>
+        </p:nvPicPr>
+        <p:blipFill>
+          <a:blip r:embed="rId3">
+            <a:extLst>
+              <a:ext uri="{28A0092B-C50C-407E-A947-70E740481C1C}">
+                <a14:useLocalDpi xmlns:a14="http://schemas.microsoft.com/office/drawing/2010/main" val="0"/>
+              </a:ext>
+            </a:extLst>
+          </a:blip>
+          <a:stretch>
+            <a:fillRect/>
+          </a:stretch>
+        </p:blipFill>
+        <p:spPr>
+          <a:xfrm>
+            <a:off x="6262081" y="2128665"/>
+            <a:ext cx="5089159" cy="3816869"/>
+          </a:xfrm>
+          <a:prstGeom prst="rect">
+            <a:avLst/>
+          </a:prstGeom>
+        </p:spPr>
+      </p:pic>
+    </p:spTree>
+    <p:extLst>
+      <p:ext uri="{BB962C8B-B14F-4D97-AF65-F5344CB8AC3E}">
+        <p14:creationId xmlns:p14="http://schemas.microsoft.com/office/powerpoint/2010/main" val="3414767645"/>
+      </p:ext>
+    </p:extLst>
+  </p:cSld>
+  <p:clrMapOvr>
+    <a:masterClrMapping/>
+  </p:clrMapOvr>
+</p:sld>
+</file>
+
+<file path=ppt/slides/slide8.xml><?xml version="1.0" encoding="utf-8"?>
 <p:sld xmlns:a="http://schemas.openxmlformats.org/drawingml/2006/main" xmlns:r="http://schemas.openxmlformats.org/officeDocument/2006/relationships" xmlns:p="http://schemas.openxmlformats.org/presentationml/2006/main">
   <p:cSld>
     <p:spTree>
@@ -7869,14 +7998,14 @@
   <p:timing>
     <p:tnLst>
       <p:par>
-        <p:cTn id="1" dur="indefinite" restart="never" nodeType="tmRoot"/>
+        <p:cTn xmlns:p14="http://schemas.microsoft.com/office/powerpoint/2010/main" id="1" dur="indefinite" restart="never" nodeType="tmRoot"/>
       </p:par>
     </p:tnLst>
   </p:timing>
 </p:sld>
 </file>
 
-<file path=ppt/slides/slide8.xml><?xml version="1.0" encoding="utf-8"?>
+<file path=ppt/slides/slide9.xml><?xml version="1.0" encoding="utf-8"?>
 <p:sld xmlns:a="http://schemas.openxmlformats.org/drawingml/2006/main" xmlns:r="http://schemas.openxmlformats.org/officeDocument/2006/relationships" xmlns:p="http://schemas.openxmlformats.org/presentationml/2006/main">
   <p:cSld>
     <p:spTree>
@@ -8006,7 +8135,7 @@
   <p:timing>
     <p:tnLst>
       <p:par>
-        <p:cTn id="1" dur="indefinite" restart="never" nodeType="tmRoot"/>
+        <p:cTn xmlns:p14="http://schemas.microsoft.com/office/powerpoint/2010/main" id="1" dur="indefinite" restart="never" nodeType="tmRoot"/>
       </p:par>
     </p:tnLst>
   </p:timing>
@@ -8056,7 +8185,7 @@
     </a:clrScheme>
     <a:fontScheme name="Mesh">
       <a:majorFont>
-        <a:latin typeface="Century Gothic" panose="020B0502020202020204"/>
+        <a:latin typeface="Century Gothic"/>
         <a:ea typeface=""/>
         <a:cs typeface=""/>
         <a:font script="Jpan" typeface="ＭＳ ゴシック"/>
@@ -8091,7 +8220,7 @@
         <a:font script="Geor" typeface="Sylfaen"/>
       </a:majorFont>
       <a:minorFont>
-        <a:latin typeface="Century Gothic" panose="020B0502020202020204"/>
+        <a:latin typeface="Century Gothic"/>
         <a:ea typeface=""/>
         <a:cs typeface=""/>
         <a:font script="Jpan" typeface="ＭＳ ゴシック"/>
@@ -8263,7 +8392,7 @@
   <a:extraClrSchemeLst/>
   <a:extLst>
     <a:ext uri="{05A4C25C-085E-4340-85A3-A5531E510DB2}">
-      <thm15:themeFamily xmlns:thm15="http://schemas.microsoft.com/office/thememl/2012/main" name="Mesh" id="{789EC3FE-34FD-429C-9918-760025E6C145}" vid="{B8BE45C0-8141-4D58-8C71-A009BC26FBBB}"/>
+      <thm15:themeFamily xmlns:thm15="http://schemas.microsoft.com/office/thememl/2012/main" xmlns="" name="Mesh" id="{789EC3FE-34FD-429C-9918-760025E6C145}" vid="{B8BE45C0-8141-4D58-8C71-A009BC26FBBB}"/>
     </a:ext>
   </a:extLst>
 </a:theme>
@@ -8312,7 +8441,7 @@
     </a:clrScheme>
     <a:fontScheme name="Office">
       <a:majorFont>
-        <a:latin typeface="Calibri Light" panose="020F0302020204030204"/>
+        <a:latin typeface="Calibri Light"/>
         <a:ea typeface=""/>
         <a:cs typeface=""/>
         <a:font script="Jpan" typeface="ＭＳ Ｐゴシック"/>
@@ -8347,7 +8476,7 @@
         <a:font script="Geor" typeface="Sylfaen"/>
       </a:majorFont>
       <a:minorFont>
-        <a:latin typeface="Calibri" panose="020F0502020204030204"/>
+        <a:latin typeface="Calibri"/>
         <a:ea typeface=""/>
         <a:cs typeface=""/>
         <a:font script="Jpan" typeface="ＭＳ Ｐゴシック"/>
@@ -8524,7 +8653,7 @@
   <a:extraClrSchemeLst/>
   <a:extLst>
     <a:ext uri="{05A4C25C-085E-4340-85A3-A5531E510DB2}">
-      <thm15:themeFamily xmlns:thm15="http://schemas.microsoft.com/office/thememl/2012/main" name="Office Theme" id="{62F939B6-93AF-4DB8-9C6B-D6C7DFDC589F}" vid="{4A3C46E8-61CC-4603-A589-7422A47A8E4A}"/>
+      <thm15:themeFamily xmlns:thm15="http://schemas.microsoft.com/office/thememl/2012/main" xmlns="" name="Office Theme" id="{62F939B6-93AF-4DB8-9C6B-D6C7DFDC589F}" vid="{4A3C46E8-61CC-4603-A589-7422A47A8E4A}"/>
     </a:ext>
   </a:extLst>
 </a:theme>

</xml_diff>